<commit_message>
after meeting with subho
</commit_message>
<xml_diff>
--- a/Connected Communities Grid Side Optimization.pptx
+++ b/Connected Communities Grid Side Optimization.pptx
@@ -141,6 +141,7 @@
 <p1510:revInfo xmlns:a="http://schemas.openxmlformats.org/drawingml/2006/main" xmlns:r="http://schemas.openxmlformats.org/officeDocument/2006/relationships" xmlns:p1510="http://schemas.microsoft.com/office/powerpoint/2015/10/main">
   <p1510:revLst>
     <p1510:client id="{159C9EA5-C6E7-49BD-975B-30C7FC0F9F0A}" v="1417" dt="2023-09-27T01:34:03.985"/>
+    <p1510:client id="{6E74DC4A-6168-41FC-A7BC-7B61E1A8676E}" v="6" dt="2023-09-27T06:35:12.072"/>
   </p1510:revLst>
 </p1510:revInfo>
 </file>
@@ -2099,6 +2100,84 @@
           </pc:sldLayoutMkLst>
         </pc:sldLayoutChg>
       </pc:sldMasterChg>
+    </pc:docChg>
+  </pc:docChgLst>
+  <pc:docChgLst>
+    <pc:chgData name="Jha, Aryan Ritwajeet" userId="2aad577e-539b-449b-83a6-8d411f484b4d" providerId="ADAL" clId="{6E74DC4A-6168-41FC-A7BC-7B61E1A8676E}"/>
+    <pc:docChg chg="custSel modSld">
+      <pc:chgData name="Jha, Aryan Ritwajeet" userId="2aad577e-539b-449b-83a6-8d411f484b4d" providerId="ADAL" clId="{6E74DC4A-6168-41FC-A7BC-7B61E1A8676E}" dt="2023-09-27T06:34:53.737" v="10"/>
+      <pc:docMkLst>
+        <pc:docMk/>
+      </pc:docMkLst>
+      <pc:sldChg chg="addSp delSp modSp mod">
+        <pc:chgData name="Jha, Aryan Ritwajeet" userId="2aad577e-539b-449b-83a6-8d411f484b4d" providerId="ADAL" clId="{6E74DC4A-6168-41FC-A7BC-7B61E1A8676E}" dt="2023-09-27T06:23:02.900" v="9" actId="1076"/>
+        <pc:sldMkLst>
+          <pc:docMk/>
+          <pc:sldMk cId="930504783" sldId="278"/>
+        </pc:sldMkLst>
+        <pc:picChg chg="add mod">
+          <ac:chgData name="Jha, Aryan Ritwajeet" userId="2aad577e-539b-449b-83a6-8d411f484b4d" providerId="ADAL" clId="{6E74DC4A-6168-41FC-A7BC-7B61E1A8676E}" dt="2023-09-27T06:23:02.900" v="9" actId="1076"/>
+          <ac:picMkLst>
+            <pc:docMk/>
+            <pc:sldMk cId="930504783" sldId="278"/>
+            <ac:picMk id="4" creationId="{03937BCE-90DF-8053-B310-BA7AC63886AA}"/>
+          </ac:picMkLst>
+        </pc:picChg>
+        <pc:picChg chg="del">
+          <ac:chgData name="Jha, Aryan Ritwajeet" userId="2aad577e-539b-449b-83a6-8d411f484b4d" providerId="ADAL" clId="{6E74DC4A-6168-41FC-A7BC-7B61E1A8676E}" dt="2023-09-27T06:23:00.716" v="7" actId="478"/>
+          <ac:picMkLst>
+            <pc:docMk/>
+            <pc:sldMk cId="930504783" sldId="278"/>
+            <ac:picMk id="5" creationId="{F3BB1098-C753-1B8B-3517-4016376D8014}"/>
+          </ac:picMkLst>
+        </pc:picChg>
+      </pc:sldChg>
+      <pc:sldChg chg="addSp delSp modSp mod">
+        <pc:chgData name="Jha, Aryan Ritwajeet" userId="2aad577e-539b-449b-83a6-8d411f484b4d" providerId="ADAL" clId="{6E74DC4A-6168-41FC-A7BC-7B61E1A8676E}" dt="2023-09-27T06:22:45.474" v="6" actId="14100"/>
+        <pc:sldMkLst>
+          <pc:docMk/>
+          <pc:sldMk cId="1858411754" sldId="279"/>
+        </pc:sldMkLst>
+        <pc:picChg chg="del">
+          <ac:chgData name="Jha, Aryan Ritwajeet" userId="2aad577e-539b-449b-83a6-8d411f484b4d" providerId="ADAL" clId="{6E74DC4A-6168-41FC-A7BC-7B61E1A8676E}" dt="2023-09-27T06:22:33.486" v="0" actId="478"/>
+          <ac:picMkLst>
+            <pc:docMk/>
+            <pc:sldMk cId="1858411754" sldId="279"/>
+            <ac:picMk id="6" creationId="{3AE44657-C62E-2C08-8BA2-2A0608D8FC96}"/>
+          </ac:picMkLst>
+        </pc:picChg>
+        <pc:picChg chg="add mod">
+          <ac:chgData name="Jha, Aryan Ritwajeet" userId="2aad577e-539b-449b-83a6-8d411f484b4d" providerId="ADAL" clId="{6E74DC4A-6168-41FC-A7BC-7B61E1A8676E}" dt="2023-09-27T06:22:39.200" v="3" actId="208"/>
+          <ac:picMkLst>
+            <pc:docMk/>
+            <pc:sldMk cId="1858411754" sldId="279"/>
+            <ac:picMk id="9" creationId="{143D3F41-A575-DB87-CE69-9E667C8617F7}"/>
+          </ac:picMkLst>
+        </pc:picChg>
+        <pc:cxnChg chg="mod">
+          <ac:chgData name="Jha, Aryan Ritwajeet" userId="2aad577e-539b-449b-83a6-8d411f484b4d" providerId="ADAL" clId="{6E74DC4A-6168-41FC-A7BC-7B61E1A8676E}" dt="2023-09-27T06:22:45.474" v="6" actId="14100"/>
+          <ac:cxnSpMkLst>
+            <pc:docMk/>
+            <pc:sldMk cId="1858411754" sldId="279"/>
+            <ac:cxnSpMk id="5" creationId="{74D483C1-7380-3AB5-C3D4-885119373EAD}"/>
+          </ac:cxnSpMkLst>
+        </pc:cxnChg>
+      </pc:sldChg>
+      <pc:sldChg chg="modSp mod">
+        <pc:chgData name="Jha, Aryan Ritwajeet" userId="2aad577e-539b-449b-83a6-8d411f484b4d" providerId="ADAL" clId="{6E74DC4A-6168-41FC-A7BC-7B61E1A8676E}" dt="2023-09-27T06:34:53.737" v="10"/>
+        <pc:sldMkLst>
+          <pc:docMk/>
+          <pc:sldMk cId="2806962077" sldId="398"/>
+        </pc:sldMkLst>
+        <pc:spChg chg="mod">
+          <ac:chgData name="Jha, Aryan Ritwajeet" userId="2aad577e-539b-449b-83a6-8d411f484b4d" providerId="ADAL" clId="{6E74DC4A-6168-41FC-A7BC-7B61E1A8676E}" dt="2023-09-27T06:34:53.737" v="10"/>
+          <ac:spMkLst>
+            <pc:docMk/>
+            <pc:sldMk cId="2806962077" sldId="398"/>
+            <ac:spMk id="3" creationId="{FC3BEC75-3ED8-3D2E-7AF0-ED68CBDE8918}"/>
+          </ac:spMkLst>
+        </pc:spChg>
+      </pc:sldChg>
     </pc:docChg>
   </pc:docChgLst>
 </pc:chgInfo>
@@ -22797,8 +22876,8 @@
           </a:p>
         </p:txBody>
       </p:sp>
-      <mc:AlternateContent xmlns:mc="http://schemas.openxmlformats.org/markup-compatibility/2006">
-        <mc:Choice xmlns:a14="http://schemas.microsoft.com/office/drawing/2010/main" Requires="a14">
+      <mc:AlternateContent xmlns:mc="http://schemas.openxmlformats.org/markup-compatibility/2006" xmlns:a14="http://schemas.microsoft.com/office/drawing/2010/main">
+        <mc:Choice Requires="a14">
           <p:sp>
             <p:nvSpPr>
               <p:cNvPr id="8" name="Rectangle 7">
@@ -22872,7 +22951,7 @@
                     <m:d>
                       <m:dPr>
                         <m:ctrlPr>
-                          <a:rPr lang="en-US" sz="1400" b="0" i="0" smtClean="0">
+                          <a:rPr lang="en-US" sz="1400" b="0" i="1" smtClean="0">
                             <a:latin typeface="Cambria Math" panose="02040503050406030204" pitchFamily="18" charset="0"/>
                           </a:rPr>
                         </m:ctrlPr>
@@ -23241,7 +23320,7 @@
                     <m:d>
                       <m:dPr>
                         <m:ctrlPr>
-                          <a:rPr lang="en-US" sz="1400" b="0" i="0" smtClean="0">
+                          <a:rPr lang="en-US" sz="1400" b="0" i="1" smtClean="0">
                             <a:latin typeface="Cambria Math" panose="02040503050406030204" pitchFamily="18" charset="0"/>
                           </a:rPr>
                         </m:ctrlPr>
@@ -23659,7 +23738,7 @@
             </p:txBody>
           </p:sp>
         </mc:Choice>
-        <mc:Fallback>
+        <mc:Fallback xmlns="">
           <p:sp>
             <p:nvSpPr>
               <p:cNvPr id="8" name="Rectangle 7">
@@ -23704,8 +23783,8 @@
           </p:sp>
         </mc:Fallback>
       </mc:AlternateContent>
-      <mc:AlternateContent xmlns:mc="http://schemas.openxmlformats.org/markup-compatibility/2006">
-        <mc:Choice xmlns:a14="http://schemas.microsoft.com/office/drawing/2010/main" Requires="a14">
+      <mc:AlternateContent xmlns:mc="http://schemas.openxmlformats.org/markup-compatibility/2006" xmlns:a14="http://schemas.microsoft.com/office/drawing/2010/main">
+        <mc:Choice Requires="a14">
           <p:sp>
             <p:nvSpPr>
               <p:cNvPr id="13" name="Rectangle 12">
@@ -24739,7 +24818,7 @@
             </p:txBody>
           </p:sp>
         </mc:Choice>
-        <mc:Fallback>
+        <mc:Fallback xmlns="">
           <p:sp>
             <p:nvSpPr>
               <p:cNvPr id="13" name="Rectangle 12">
@@ -25160,8 +25239,8 @@
           </a:p>
         </p:txBody>
       </p:sp>
-      <mc:AlternateContent xmlns:mc="http://schemas.openxmlformats.org/markup-compatibility/2006">
-        <mc:Choice xmlns:a14="http://schemas.microsoft.com/office/drawing/2010/main" Requires="a14">
+      <mc:AlternateContent xmlns:mc="http://schemas.openxmlformats.org/markup-compatibility/2006" xmlns:a14="http://schemas.microsoft.com/office/drawing/2010/main">
+        <mc:Choice Requires="a14">
           <p:sp>
             <p:nvSpPr>
               <p:cNvPr id="5" name="Content Placeholder 4">
@@ -25244,7 +25323,7 @@
             </p:txBody>
           </p:sp>
         </mc:Choice>
-        <mc:Fallback>
+        <mc:Fallback xmlns="">
           <p:sp>
             <p:nvSpPr>
               <p:cNvPr id="5" name="Content Placeholder 4">
@@ -33490,25 +33569,20 @@
               <a:rPr lang="en-US" dirty="0">
                 <a:latin typeface="Tw Cen MT" panose="020B0602020104020603" pitchFamily="34" charset="0"/>
               </a:rPr>
-              <a:t>Sadnan, R., &amp; Dubey, A. (2022). Distributed Computing for Scalable Optimal Power Flow in Large Radial Electric Power Distribution Systems with Distributed Energy Resources. </a:t>
+              <a:t>Sadnan, R., &amp; Dubey, A. (2021). Distributed Optimization Using Reduced Network Equivalents for Radial Power Distribution Systems. IEEE Trans. Power Syst., 36(4), 3645–3656. </a:t>
             </a:r>
             <a:r>
               <a:rPr lang="en-US" dirty="0" err="1">
                 <a:latin typeface="Tw Cen MT" panose="020B0602020104020603" pitchFamily="34" charset="0"/>
               </a:rPr>
-              <a:t>arXiv</a:t>
+              <a:t>doi</a:t>
             </a:r>
             <a:r>
               <a:rPr lang="en-US" dirty="0">
                 <a:latin typeface="Tw Cen MT" panose="020B0602020104020603" pitchFamily="34" charset="0"/>
               </a:rPr>
-              <a:t>, 2211.03920. Retrieved from https://arxiv.org/abs/2211.03920v1</a:t>
+              <a:t>: 10.1109/TPWRS.2020.3049135</a:t>
             </a:r>
-            <a:endParaRPr lang="en-IN" dirty="0">
-              <a:latin typeface="Tw Cen MT" panose="020B0602020104020603" pitchFamily="34" charset="0"/>
-            </a:endParaRPr>
-          </a:p>
-          <a:p>
             <a:endParaRPr lang="en-US" dirty="0"/>
           </a:p>
         </p:txBody>
@@ -33716,44 +33790,54 @@
       </mc:AlternateContent>
       <p:pic>
         <p:nvPicPr>
-          <p:cNvPr id="5" name="Picture 4" descr="Diagram. &#10;IEEE 123 Node Test Feeder.">
-            <a:hlinkClick r:id="rId3"/>
+          <p:cNvPr id="4" name="Picture 2">
             <a:extLst>
               <a:ext uri="{FF2B5EF4-FFF2-40B4-BE49-F238E27FC236}">
-                <a16:creationId xmlns:a16="http://schemas.microsoft.com/office/drawing/2014/main" id="{F3BB1098-C753-1B8B-3517-4016376D8014}"/>
+                <a16:creationId xmlns:a16="http://schemas.microsoft.com/office/drawing/2014/main" id="{03937BCE-90DF-8053-B310-BA7AC63886AA}"/>
               </a:ext>
             </a:extLst>
           </p:cNvPr>
           <p:cNvPicPr>
-            <a:picLocks noChangeAspect="1"/>
+            <a:picLocks noChangeAspect="1" noChangeArrowheads="1"/>
           </p:cNvPicPr>
           <p:nvPr/>
         </p:nvPicPr>
         <p:blipFill>
-          <a:blip r:embed="rId4">
+          <a:blip r:embed="rId3">
             <a:extLst>
               <a:ext uri="{28A0092B-C50C-407E-A947-70E740481C1C}">
                 <a14:useLocalDpi xmlns:a14="http://schemas.microsoft.com/office/drawing/2010/main" val="0"/>
               </a:ext>
             </a:extLst>
           </a:blip>
+          <a:srcRect/>
           <a:stretch>
             <a:fillRect/>
           </a:stretch>
         </p:blipFill>
-        <p:spPr>
+        <p:spPr bwMode="auto">
           <a:xfrm>
-            <a:off x="5717863" y="2101096"/>
-            <a:ext cx="5991225" cy="4248150"/>
+            <a:off x="6096000" y="2434193"/>
+            <a:ext cx="5591175" cy="3419475"/>
           </a:xfrm>
           <a:prstGeom prst="rect">
             <a:avLst/>
           </a:prstGeom>
+          <a:noFill/>
           <a:ln>
             <a:solidFill>
-              <a:srgbClr val="BD90EE"/>
+              <a:schemeClr val="accent1"/>
             </a:solidFill>
           </a:ln>
+          <a:extLst>
+            <a:ext uri="{909E8E84-426E-40DD-AFC4-6F175D3DCCD1}">
+              <a14:hiddenFill xmlns:a14="http://schemas.microsoft.com/office/drawing/2010/main">
+                <a:solidFill>
+                  <a:srgbClr val="FFFFFF"/>
+                </a:solidFill>
+              </a14:hiddenFill>
+            </a:ext>
+          </a:extLst>
         </p:spPr>
       </p:pic>
     </p:spTree>
@@ -33866,48 +33950,6 @@
           </a:p>
         </p:txBody>
       </p:sp>
-      <p:pic>
-        <p:nvPicPr>
-          <p:cNvPr id="6" name="Picture 5" descr="Diagram&#10;&#10;IEEE 123 Node Test Feeder divided into four Areas.">
-            <a:hlinkClick r:id="rId2"/>
-            <a:extLst>
-              <a:ext uri="{FF2B5EF4-FFF2-40B4-BE49-F238E27FC236}">
-                <a16:creationId xmlns:a16="http://schemas.microsoft.com/office/drawing/2014/main" id="{3AE44657-C62E-2C08-8BA2-2A0608D8FC96}"/>
-              </a:ext>
-            </a:extLst>
-          </p:cNvPr>
-          <p:cNvPicPr>
-            <a:picLocks noChangeAspect="1"/>
-          </p:cNvPicPr>
-          <p:nvPr/>
-        </p:nvPicPr>
-        <p:blipFill>
-          <a:blip r:embed="rId3">
-            <a:extLst>
-              <a:ext uri="{28A0092B-C50C-407E-A947-70E740481C1C}">
-                <a14:useLocalDpi xmlns:a14="http://schemas.microsoft.com/office/drawing/2010/main" val="0"/>
-              </a:ext>
-            </a:extLst>
-          </a:blip>
-          <a:stretch>
-            <a:fillRect/>
-          </a:stretch>
-        </p:blipFill>
-        <p:spPr>
-          <a:xfrm>
-            <a:off x="6190090" y="3021569"/>
-            <a:ext cx="5238750" cy="3609975"/>
-          </a:xfrm>
-          <a:prstGeom prst="rect">
-            <a:avLst/>
-          </a:prstGeom>
-          <a:ln>
-            <a:solidFill>
-              <a:srgbClr val="BD90EE"/>
-            </a:solidFill>
-          </a:ln>
-        </p:spPr>
-      </p:pic>
       <mc:AlternateContent xmlns:mc="http://schemas.openxmlformats.org/markup-compatibility/2006" xmlns:a14="http://schemas.microsoft.com/office/drawing/2010/main">
         <mc:Choice Requires="a14">
           <p:sp>
@@ -34215,15 +34257,15 @@
           </p:cNvPr>
           <p:cNvCxnSpPr>
             <a:cxnSpLocks/>
-            <a:stCxn id="6" idx="0"/>
+            <a:stCxn id="9" idx="0"/>
             <a:endCxn id="4" idx="2"/>
           </p:cNvCxnSpPr>
           <p:nvPr/>
         </p:nvCxnSpPr>
         <p:spPr>
           <a:xfrm flipV="1">
-            <a:off x="8809465" y="2165430"/>
-            <a:ext cx="1513866" cy="856139"/>
+            <a:off x="8891588" y="2165430"/>
+            <a:ext cx="1431743" cy="817403"/>
           </a:xfrm>
           <a:prstGeom prst="straightConnector1">
             <a:avLst/>
@@ -34353,6 +34395,58 @@
           </p:txBody>
         </p:sp>
       </p:grpSp>
+      <p:pic>
+        <p:nvPicPr>
+          <p:cNvPr id="9" name="Picture 2">
+            <a:extLst>
+              <a:ext uri="{FF2B5EF4-FFF2-40B4-BE49-F238E27FC236}">
+                <a16:creationId xmlns:a16="http://schemas.microsoft.com/office/drawing/2014/main" id="{143D3F41-A575-DB87-CE69-9E667C8617F7}"/>
+              </a:ext>
+            </a:extLst>
+          </p:cNvPr>
+          <p:cNvPicPr>
+            <a:picLocks noChangeAspect="1" noChangeArrowheads="1"/>
+          </p:cNvPicPr>
+          <p:nvPr/>
+        </p:nvPicPr>
+        <p:blipFill>
+          <a:blip r:embed="rId6">
+            <a:extLst>
+              <a:ext uri="{28A0092B-C50C-407E-A947-70E740481C1C}">
+                <a14:useLocalDpi xmlns:a14="http://schemas.microsoft.com/office/drawing/2010/main" val="0"/>
+              </a:ext>
+            </a:extLst>
+          </a:blip>
+          <a:srcRect/>
+          <a:stretch>
+            <a:fillRect/>
+          </a:stretch>
+        </p:blipFill>
+        <p:spPr bwMode="auto">
+          <a:xfrm>
+            <a:off x="6096000" y="2982833"/>
+            <a:ext cx="5591175" cy="3419475"/>
+          </a:xfrm>
+          <a:prstGeom prst="rect">
+            <a:avLst/>
+          </a:prstGeom>
+          <a:noFill/>
+          <a:ln>
+            <a:solidFill>
+              <a:schemeClr val="accent1"/>
+            </a:solidFill>
+          </a:ln>
+          <a:extLst>
+            <a:ext uri="{909E8E84-426E-40DD-AFC4-6F175D3DCCD1}">
+              <a14:hiddenFill xmlns:a14="http://schemas.microsoft.com/office/drawing/2010/main">
+                <a:solidFill>
+                  <a:srgbClr val="FFFFFF"/>
+                </a:solidFill>
+              </a14:hiddenFill>
+            </a:ext>
+          </a:extLst>
+        </p:spPr>
+      </p:pic>
     </p:spTree>
     <p:extLst>
       <p:ext uri="{BB962C8B-B14F-4D97-AF65-F5344CB8AC3E}">
@@ -35573,8 +35667,8 @@
           </a:p>
         </p:txBody>
       </p:sp>
-      <mc:AlternateContent xmlns:mc="http://schemas.openxmlformats.org/markup-compatibility/2006">
-        <mc:Choice xmlns:a14="http://schemas.microsoft.com/office/drawing/2010/main" Requires="a14">
+      <mc:AlternateContent xmlns:mc="http://schemas.openxmlformats.org/markup-compatibility/2006" xmlns:a14="http://schemas.microsoft.com/office/drawing/2010/main">
+        <mc:Choice Requires="a14">
           <p:sp>
             <p:nvSpPr>
               <p:cNvPr id="4" name="TextBox 3">
@@ -36542,7 +36636,7 @@
             </p:txBody>
           </p:sp>
         </mc:Choice>
-        <mc:Fallback>
+        <mc:Fallback xmlns="">
           <p:sp>
             <p:nvSpPr>
               <p:cNvPr id="4" name="TextBox 3">
@@ -39592,8 +39686,8 @@
           </a:p>
         </p:txBody>
       </p:sp>
-      <mc:AlternateContent xmlns:mc="http://schemas.openxmlformats.org/markup-compatibility/2006">
-        <mc:Choice xmlns:a14="http://schemas.microsoft.com/office/drawing/2010/main" Requires="a14">
+      <mc:AlternateContent xmlns:mc="http://schemas.openxmlformats.org/markup-compatibility/2006" xmlns:a14="http://schemas.microsoft.com/office/drawing/2010/main">
+        <mc:Choice Requires="a14">
           <p:sp>
             <p:nvSpPr>
               <p:cNvPr id="3" name="Content Placeholder 2">
@@ -40105,7 +40199,7 @@
             </p:txBody>
           </p:sp>
         </mc:Choice>
-        <mc:Fallback>
+        <mc:Fallback xmlns="">
           <p:sp>
             <p:nvSpPr>
               <p:cNvPr id="3" name="Content Placeholder 2">

</xml_diff>